<commit_message>
tweak 3color-crossover.pptx; hide hint in CP_3color_OR_gate
</commit_message>
<xml_diff>
--- a/spring15/slidesS15/3color-crossover.pptx
+++ b/spring15/slidesS15/3color-crossover.pptx
@@ -205,7 +205,7 @@
           <a:p>
             <a:fld id="{87F6AD9C-E6DA-3940-AC2D-477A29366DD0}" type="datetimeFigureOut">
               <a:rPr lang="en-US" smtClean="0"/>
-              <a:t>3/21/15</a:t>
+              <a:t>3/22/15</a:t>
             </a:fld>
             <a:endParaRPr lang="en-US"/>
           </a:p>
@@ -1109,37 +1109,7 @@
                 <a:uFillTx/>
                 <a:latin typeface="Comic Sans MS" pitchFamily="66" charset="0"/>
               </a:rPr>
-              <a:t>Albert R Meyer            </a:t>
-            </a:r>
-            <a:r>
-              <a:rPr kumimoji="0" lang="en-US" sz="1200" b="0" i="0" u="none" strike="noStrike" kern="1200" cap="none" spc="0" normalizeH="0" baseline="0" noProof="0" dirty="0" smtClean="0">
-                <a:ln>
-                  <a:noFill/>
-                </a:ln>
-                <a:solidFill>
-                  <a:schemeClr val="tx1"/>
-                </a:solidFill>
-                <a:effectLst/>
-                <a:uLnTx/>
-                <a:uFillTx/>
-                <a:latin typeface="Comic Sans MS" pitchFamily="66" charset="0"/>
-              </a:rPr>
-              <a:t>April 3, </a:t>
-            </a:r>
-            <a:r>
-              <a:rPr kumimoji="0" lang="en-US" sz="1200" b="0" i="0" u="none" strike="noStrike" kern="1200" cap="none" spc="0" normalizeH="0" baseline="0" noProof="0" dirty="0" smtClean="0">
-                <a:ln>
-                  <a:noFill/>
-                </a:ln>
-                <a:solidFill>
-                  <a:schemeClr val="tx1"/>
-                </a:solidFill>
-                <a:effectLst/>
-                <a:uLnTx/>
-                <a:uFillTx/>
-                <a:latin typeface="Comic Sans MS" pitchFamily="66" charset="0"/>
-              </a:rPr>
-              <a:t>2015</a:t>
+              <a:t>Albert R Meyer            April 3, 2015</a:t>
             </a:r>
             <a:endParaRPr kumimoji="0" lang="en-US" sz="1200" b="0" i="0" u="none" strike="noStrike" kern="1200" cap="none" spc="0" normalizeH="0" baseline="0" noProof="0" dirty="0">
               <a:ln>
@@ -19981,7 +19951,7 @@
                             </p:stCondLst>
                             <p:childTnLst>
                               <p:par>
-                                <p:cTn id="5" presetID="22" presetClass="entr" presetSubtype="1" fill="hold" nodeType="clickEffect">
+                                <p:cTn id="5" presetID="10" presetClass="entr" presetSubtype="0" fill="hold" nodeType="clickEffect">
                                   <p:stCondLst>
                                     <p:cond delay="0"/>
                                   </p:stCondLst>
@@ -20004,9 +19974,9 @@
                                         <p:strVal val="visible"/>
                                       </p:to>
                                     </p:set>
-                                    <p:animEffect transition="in" filter="wipe(up)">
+                                    <p:animEffect transition="in" filter="fade">
                                       <p:cBhvr>
-                                        <p:cTn id="7" dur="1000"/>
+                                        <p:cTn id="7" dur="500"/>
                                         <p:tgtEl>
                                           <p:spTgt spid="40"/>
                                         </p:tgtEl>

</xml_diff>